<commit_message>
DevOps Overview: Update Access-related Info (#34)
</commit_message>
<xml_diff>
--- a/docs/devops/images/devops-overview/devops-overview-diagrams.pptx
+++ b/docs/devops/images/devops-overview/devops-overview-diagrams.pptx
@@ -207,7 +207,7 @@
           <a:p>
             <a:fld id="{704E186B-BB6E-441E-AD74-265B2DDA44BB}" type="datetimeFigureOut">
               <a:rPr lang="en-US" smtClean="0"/>
-              <a:t>1/15/2019</a:t>
+              <a:t>1/17/2019</a:t>
             </a:fld>
             <a:endParaRPr lang="en-US"/>
           </a:p>
@@ -907,7 +907,7 @@
           <a:p>
             <a:fld id="{E13D1C8E-8657-464B-A664-DB675E9B0B50}" type="datetimeFigureOut">
               <a:rPr lang="en-US" smtClean="0"/>
-              <a:t>1/15/2019</a:t>
+              <a:t>1/17/2019</a:t>
             </a:fld>
             <a:endParaRPr lang="en-US"/>
           </a:p>
@@ -1105,7 +1105,7 @@
           <a:p>
             <a:fld id="{E13D1C8E-8657-464B-A664-DB675E9B0B50}" type="datetimeFigureOut">
               <a:rPr lang="en-US" smtClean="0"/>
-              <a:t>1/15/2019</a:t>
+              <a:t>1/17/2019</a:t>
             </a:fld>
             <a:endParaRPr lang="en-US"/>
           </a:p>
@@ -1313,7 +1313,7 @@
           <a:p>
             <a:fld id="{E13D1C8E-8657-464B-A664-DB675E9B0B50}" type="datetimeFigureOut">
               <a:rPr lang="en-US" smtClean="0"/>
-              <a:t>1/15/2019</a:t>
+              <a:t>1/17/2019</a:t>
             </a:fld>
             <a:endParaRPr lang="en-US"/>
           </a:p>
@@ -3633,7 +3633,7 @@
           <a:p>
             <a:fld id="{E13D1C8E-8657-464B-A664-DB675E9B0B50}" type="datetimeFigureOut">
               <a:rPr lang="en-US" smtClean="0"/>
-              <a:t>1/15/2019</a:t>
+              <a:t>1/17/2019</a:t>
             </a:fld>
             <a:endParaRPr lang="en-US"/>
           </a:p>
@@ -9335,7 +9335,7 @@
           <a:p>
             <a:fld id="{E13D1C8E-8657-464B-A664-DB675E9B0B50}" type="datetimeFigureOut">
               <a:rPr lang="en-US" smtClean="0"/>
-              <a:t>1/15/2019</a:t>
+              <a:t>1/17/2019</a:t>
             </a:fld>
             <a:endParaRPr lang="en-US"/>
           </a:p>
@@ -12311,7 +12311,7 @@
           <a:p>
             <a:fld id="{E13D1C8E-8657-464B-A664-DB675E9B0B50}" type="datetimeFigureOut">
               <a:rPr lang="en-US" smtClean="0"/>
-              <a:t>1/15/2019</a:t>
+              <a:t>1/17/2019</a:t>
             </a:fld>
             <a:endParaRPr lang="en-US"/>
           </a:p>
@@ -14419,7 +14419,7 @@
           <a:p>
             <a:fld id="{E13D1C8E-8657-464B-A664-DB675E9B0B50}" type="datetimeFigureOut">
               <a:rPr lang="en-US" smtClean="0"/>
-              <a:t>1/15/2019</a:t>
+              <a:t>1/17/2019</a:t>
             </a:fld>
             <a:endParaRPr lang="en-US"/>
           </a:p>
@@ -20653,7 +20653,7 @@
           <a:p>
             <a:fld id="{E13D1C8E-8657-464B-A664-DB675E9B0B50}" type="datetimeFigureOut">
               <a:rPr lang="en-US" smtClean="0"/>
-              <a:t>1/15/2019</a:t>
+              <a:t>1/17/2019</a:t>
             </a:fld>
             <a:endParaRPr lang="en-US"/>
           </a:p>
@@ -20960,7 +20960,7 @@
           <a:p>
             <a:fld id="{E13D1C8E-8657-464B-A664-DB675E9B0B50}" type="datetimeFigureOut">
               <a:rPr lang="en-US" smtClean="0"/>
-              <a:t>1/15/2019</a:t>
+              <a:t>1/17/2019</a:t>
             </a:fld>
             <a:endParaRPr lang="en-US"/>
           </a:p>
@@ -21271,7 +21271,7 @@
           <a:p>
             <a:fld id="{E13D1C8E-8657-464B-A664-DB675E9B0B50}" type="datetimeFigureOut">
               <a:rPr lang="en-US" smtClean="0"/>
-              <a:t>1/15/2019</a:t>
+              <a:t>1/17/2019</a:t>
             </a:fld>
             <a:endParaRPr lang="en-US"/>
           </a:p>
@@ -21559,7 +21559,7 @@
           <a:p>
             <a:fld id="{E13D1C8E-8657-464B-A664-DB675E9B0B50}" type="datetimeFigureOut">
               <a:rPr lang="en-US" smtClean="0"/>
-              <a:t>1/15/2019</a:t>
+              <a:t>1/17/2019</a:t>
             </a:fld>
             <a:endParaRPr lang="en-US"/>
           </a:p>
@@ -21800,7 +21800,7 @@
           <a:p>
             <a:fld id="{E13D1C8E-8657-464B-A664-DB675E9B0B50}" type="datetimeFigureOut">
               <a:rPr lang="en-US" smtClean="0"/>
-              <a:t>1/15/2019</a:t>
+              <a:t>1/17/2019</a:t>
             </a:fld>
             <a:endParaRPr lang="en-US"/>
           </a:p>
@@ -26668,7 +26668,7 @@
                 <a:latin typeface="Arial" panose="020B0604020202020204" pitchFamily="34" charset="0"/>
                 <a:cs typeface="Arial" panose="020B0604020202020204" pitchFamily="34" charset="0"/>
               </a:rPr>
-              <a:t>* Contributor on resource level </a:t>
+              <a:t>* </a:t>
             </a:r>
             <a:r>
               <a:rPr lang="en-US" sz="1200" dirty="0" smtClean="0">
@@ -26678,7 +26678,7 @@
                 <a:latin typeface="Arial" panose="020B0604020202020204" pitchFamily="34" charset="0"/>
                 <a:cs typeface="Arial" panose="020B0604020202020204" pitchFamily="34" charset="0"/>
               </a:rPr>
-              <a:t>in </a:t>
+              <a:t>Restricted contributor access in </a:t>
             </a:r>
             <a:r>
               <a:rPr lang="en-US" sz="1200" dirty="0">
@@ -26688,8 +26688,25 @@
                 <a:latin typeface="Arial" panose="020B0604020202020204" pitchFamily="34" charset="0"/>
                 <a:cs typeface="Arial" panose="020B0604020202020204" pitchFamily="34" charset="0"/>
               </a:rPr>
-              <a:t>Dev environment only</a:t>
-            </a:r>
+              <a:t>Dev </a:t>
+            </a:r>
+            <a:r>
+              <a:rPr lang="en-US" sz="1200" dirty="0" smtClean="0">
+                <a:solidFill>
+                  <a:srgbClr val="344447"/>
+                </a:solidFill>
+                <a:latin typeface="Arial" panose="020B0604020202020204" pitchFamily="34" charset="0"/>
+                <a:cs typeface="Arial" panose="020B0604020202020204" pitchFamily="34" charset="0"/>
+              </a:rPr>
+              <a:t>environment</a:t>
+            </a:r>
+            <a:endParaRPr lang="en-US" sz="1200" dirty="0">
+              <a:solidFill>
+                <a:srgbClr val="344447"/>
+              </a:solidFill>
+              <a:latin typeface="Arial" panose="020B0604020202020204" pitchFamily="34" charset="0"/>
+              <a:cs typeface="Arial" panose="020B0604020202020204" pitchFamily="34" charset="0"/>
+            </a:endParaRPr>
           </a:p>
         </p:txBody>
       </p:sp>
@@ -28700,7 +28717,7 @@
         <p:spPr>
           <a:xfrm>
             <a:off x="9095983" y="6001268"/>
-            <a:ext cx="2255746" cy="276999"/>
+            <a:ext cx="2300630" cy="276999"/>
           </a:xfrm>
           <a:prstGeom prst="rect">
             <a:avLst/>
@@ -28714,12 +28731,23 @@
           <a:lstStyle/>
           <a:p>
             <a:r>
-              <a:rPr lang="en-US" sz="1200">
+              <a:rPr lang="en-US" sz="1200" dirty="0">
                 <a:latin typeface="Arial" panose="020B0604020202020204" pitchFamily="34" charset="0"/>
                 <a:cs typeface="Arial" panose="020B0604020202020204" pitchFamily="34" charset="0"/>
               </a:rPr>
-              <a:t>* Contributor on resource level</a:t>
-            </a:r>
+              <a:t>* </a:t>
+            </a:r>
+            <a:r>
+              <a:rPr lang="en-US" sz="1200" dirty="0" smtClean="0">
+                <a:latin typeface="Arial" panose="020B0604020202020204" pitchFamily="34" charset="0"/>
+                <a:cs typeface="Arial" panose="020B0604020202020204" pitchFamily="34" charset="0"/>
+              </a:rPr>
+              <a:t>Restricted Contributor access</a:t>
+            </a:r>
+            <a:endParaRPr lang="en-US" sz="1200" dirty="0">
+              <a:latin typeface="Arial" panose="020B0604020202020204" pitchFamily="34" charset="0"/>
+              <a:cs typeface="Arial" panose="020B0604020202020204" pitchFamily="34" charset="0"/>
+            </a:endParaRPr>
           </a:p>
         </p:txBody>
       </p:sp>
@@ -28761,6 +28789,43 @@
           <a:effectLst/>
         </p:spPr>
       </p:cxnSp>
+      <p:cxnSp>
+        <p:nvCxnSpPr>
+          <p:cNvPr id="40" name="Connector: Elbow 44">
+            <a:extLst>
+              <a:ext uri="{FF2B5EF4-FFF2-40B4-BE49-F238E27FC236}">
+                <a16:creationId xmlns:a16="http://schemas.microsoft.com/office/drawing/2014/main" xmlns="" id="{4FAF8553-344E-4ABF-AC12-0B2C1FF6F067}"/>
+              </a:ext>
+            </a:extLst>
+          </p:cNvPr>
+          <p:cNvCxnSpPr>
+            <a:cxnSpLocks/>
+          </p:cNvCxnSpPr>
+          <p:nvPr/>
+        </p:nvCxnSpPr>
+        <p:spPr bwMode="auto">
+          <a:xfrm rot="10800000">
+            <a:off x="2821842" y="3899469"/>
+            <a:ext cx="1573366" cy="122513"/>
+          </a:xfrm>
+          <a:prstGeom prst="bentConnector2">
+            <a:avLst/>
+          </a:prstGeom>
+          <a:solidFill>
+            <a:schemeClr val="accent1"/>
+          </a:solidFill>
+          <a:ln w="9525" cap="flat" cmpd="sng" algn="ctr">
+            <a:solidFill>
+              <a:schemeClr val="tx1"/>
+            </a:solidFill>
+            <a:prstDash val="solid"/>
+            <a:round/>
+            <a:headEnd type="none" w="med" len="med"/>
+            <a:tailEnd type="none" w="med" len="med"/>
+          </a:ln>
+          <a:effectLst/>
+        </p:spPr>
+      </p:cxnSp>
     </p:spTree>
     <p:extLst>
       <p:ext uri="{BB962C8B-B14F-4D97-AF65-F5344CB8AC3E}">
@@ -28771,6 +28836,13 @@
   <p:clrMapOvr>
     <a:masterClrMapping/>
   </p:clrMapOvr>
+  <p:timing>
+    <p:tnLst>
+      <p:par>
+        <p:cTn id="1" dur="indefinite" restart="never" nodeType="tmRoot"/>
+      </p:par>
+    </p:tnLst>
+  </p:timing>
 </p:sld>
 </file>
 

</xml_diff>